<commit_message>
Uploaded scripts template for wanlu to create libraries
</commit_message>
<xml_diff>
--- a/PRD/mock-ups for Yihan's project.pptx
+++ b/PRD/mock-ups for Yihan's project.pptx
@@ -5,7 +5,7 @@
     <p:sldMasterId id="2147483648" r:id="rId1"/>
   </p:sldMasterIdLst>
   <p:notesMasterIdLst>
-    <p:notesMasterId r:id="rId8"/>
+    <p:notesMasterId r:id="rId9"/>
   </p:notesMasterIdLst>
   <p:sldIdLst>
     <p:sldId id="258" r:id="rId2"/>
@@ -14,6 +14,7 @@
     <p:sldId id="262" r:id="rId5"/>
     <p:sldId id="263" r:id="rId6"/>
     <p:sldId id="264" r:id="rId7"/>
+    <p:sldId id="265" r:id="rId8"/>
   </p:sldIdLst>
   <p:sldSz cx="12192000" cy="6858000"/>
   <p:notesSz cx="6858000" cy="9144000"/>
@@ -112,6 +113,14 @@
       </a:defRPr>
     </a:lvl9pPr>
   </p:defaultTextStyle>
+  <p:extLst>
+    <p:ext uri="{EFAFB233-063F-42B5-8137-9DF3F51BA10A}">
+      <p15:sldGuideLst xmlns:p15="http://schemas.microsoft.com/office/powerpoint/2012/main"/>
+    </p:ext>
+    <p:ext uri="{2D200454-40CA-4A62-9FC3-DE9A4176ACB9}">
+      <p15:notesGuideLst xmlns:p15="http://schemas.microsoft.com/office/powerpoint/2012/main"/>
+    </p:ext>
+  </p:extLst>
 </p:presentation>
 </file>
 
@@ -197,7 +206,7 @@
           <a:p>
             <a:fld id="{ABF36AD8-19A8-7B40-9F96-270F4AD314FE}" type="datetimeFigureOut">
               <a:rPr lang="en-US" smtClean="0"/>
-              <a:t>5/10/18</a:t>
+              <a:t>5/11/18</a:t>
             </a:fld>
             <a:endParaRPr lang="en-US"/>
           </a:p>
@@ -1122,7 +1131,7 @@
           <a:p>
             <a:fld id="{4096D1C9-D0EA-5846-A11D-A9FE0A97A53F}" type="datetimeFigureOut">
               <a:rPr lang="en-US" smtClean="0"/>
-              <a:t>5/10/18</a:t>
+              <a:t>5/11/18</a:t>
             </a:fld>
             <a:endParaRPr lang="en-US"/>
           </a:p>
@@ -1292,7 +1301,7 @@
           <a:p>
             <a:fld id="{4096D1C9-D0EA-5846-A11D-A9FE0A97A53F}" type="datetimeFigureOut">
               <a:rPr lang="en-US" smtClean="0"/>
-              <a:t>5/10/18</a:t>
+              <a:t>5/11/18</a:t>
             </a:fld>
             <a:endParaRPr lang="en-US"/>
           </a:p>
@@ -1472,7 +1481,7 @@
           <a:p>
             <a:fld id="{4096D1C9-D0EA-5846-A11D-A9FE0A97A53F}" type="datetimeFigureOut">
               <a:rPr lang="en-US" smtClean="0"/>
-              <a:t>5/10/18</a:t>
+              <a:t>5/11/18</a:t>
             </a:fld>
             <a:endParaRPr lang="en-US"/>
           </a:p>
@@ -1642,7 +1651,7 @@
           <a:p>
             <a:fld id="{4096D1C9-D0EA-5846-A11D-A9FE0A97A53F}" type="datetimeFigureOut">
               <a:rPr lang="en-US" smtClean="0"/>
-              <a:t>5/10/18</a:t>
+              <a:t>5/11/18</a:t>
             </a:fld>
             <a:endParaRPr lang="en-US"/>
           </a:p>
@@ -1888,7 +1897,7 @@
           <a:p>
             <a:fld id="{4096D1C9-D0EA-5846-A11D-A9FE0A97A53F}" type="datetimeFigureOut">
               <a:rPr lang="en-US" smtClean="0"/>
-              <a:t>5/10/18</a:t>
+              <a:t>5/11/18</a:t>
             </a:fld>
             <a:endParaRPr lang="en-US"/>
           </a:p>
@@ -2120,7 +2129,7 @@
           <a:p>
             <a:fld id="{4096D1C9-D0EA-5846-A11D-A9FE0A97A53F}" type="datetimeFigureOut">
               <a:rPr lang="en-US" smtClean="0"/>
-              <a:t>5/10/18</a:t>
+              <a:t>5/11/18</a:t>
             </a:fld>
             <a:endParaRPr lang="en-US"/>
           </a:p>
@@ -2487,7 +2496,7 @@
           <a:p>
             <a:fld id="{4096D1C9-D0EA-5846-A11D-A9FE0A97A53F}" type="datetimeFigureOut">
               <a:rPr lang="en-US" smtClean="0"/>
-              <a:t>5/10/18</a:t>
+              <a:t>5/11/18</a:t>
             </a:fld>
             <a:endParaRPr lang="en-US"/>
           </a:p>
@@ -2605,7 +2614,7 @@
           <a:p>
             <a:fld id="{4096D1C9-D0EA-5846-A11D-A9FE0A97A53F}" type="datetimeFigureOut">
               <a:rPr lang="en-US" smtClean="0"/>
-              <a:t>5/10/18</a:t>
+              <a:t>5/11/18</a:t>
             </a:fld>
             <a:endParaRPr lang="en-US"/>
           </a:p>
@@ -2700,7 +2709,7 @@
           <a:p>
             <a:fld id="{4096D1C9-D0EA-5846-A11D-A9FE0A97A53F}" type="datetimeFigureOut">
               <a:rPr lang="en-US" smtClean="0"/>
-              <a:t>5/10/18</a:t>
+              <a:t>5/11/18</a:t>
             </a:fld>
             <a:endParaRPr lang="en-US"/>
           </a:p>
@@ -2977,7 +2986,7 @@
           <a:p>
             <a:fld id="{4096D1C9-D0EA-5846-A11D-A9FE0A97A53F}" type="datetimeFigureOut">
               <a:rPr lang="en-US" smtClean="0"/>
-              <a:t>5/10/18</a:t>
+              <a:t>5/11/18</a:t>
             </a:fld>
             <a:endParaRPr lang="en-US"/>
           </a:p>
@@ -3230,7 +3239,7 @@
           <a:p>
             <a:fld id="{4096D1C9-D0EA-5846-A11D-A9FE0A97A53F}" type="datetimeFigureOut">
               <a:rPr lang="en-US" smtClean="0"/>
-              <a:t>5/10/18</a:t>
+              <a:t>5/11/18</a:t>
             </a:fld>
             <a:endParaRPr lang="en-US"/>
           </a:p>
@@ -3443,7 +3452,7 @@
           <a:p>
             <a:fld id="{4096D1C9-D0EA-5846-A11D-A9FE0A97A53F}" type="datetimeFigureOut">
               <a:rPr lang="en-US" smtClean="0"/>
-              <a:t>5/10/18</a:t>
+              <a:t>5/11/18</a:t>
             </a:fld>
             <a:endParaRPr lang="en-US"/>
           </a:p>
@@ -4187,12 +4196,6 @@
               </a:rPr>
               <a:t> how are you doing?</a:t>
             </a:r>
-            <a:endParaRPr lang="en-US" dirty="0" smtClean="0">
-              <a:effectLst/>
-              <a:latin typeface="Calibri" charset="0"/>
-              <a:ea typeface="Calibri" charset="0"/>
-              <a:cs typeface="Times New Roman" charset="0"/>
-            </a:endParaRPr>
           </a:p>
         </p:txBody>
       </p:sp>
@@ -4532,12 +4535,6 @@
               </a:rPr>
               <a:t> Capital as a financial advisor for 3 years. I am chosen and trusted many customers for wealth management.</a:t>
             </a:r>
-            <a:endParaRPr lang="en-US" dirty="0" smtClean="0">
-              <a:effectLst/>
-              <a:latin typeface="Calibri" charset="0"/>
-              <a:ea typeface="Calibri" charset="0"/>
-              <a:cs typeface="Times New Roman" charset="0"/>
-            </a:endParaRPr>
           </a:p>
         </p:txBody>
       </p:sp>
@@ -4953,12 +4950,6 @@
               </a:rPr>
               <a:t> how are you doing?</a:t>
             </a:r>
-            <a:endParaRPr lang="en-US" dirty="0" smtClean="0">
-              <a:effectLst/>
-              <a:latin typeface="Calibri" charset="0"/>
-              <a:ea typeface="Calibri" charset="0"/>
-              <a:cs typeface="Times New Roman" charset="0"/>
-            </a:endParaRPr>
           </a:p>
         </p:txBody>
       </p:sp>
@@ -5315,12 +5306,6 @@
               </a:rPr>
               <a:t>any customers have chosen and trusted me for wealth management.</a:t>
             </a:r>
-            <a:endParaRPr lang="en-US" dirty="0" smtClean="0">
-              <a:effectLst/>
-              <a:latin typeface="Calibri" charset="0"/>
-              <a:ea typeface="Calibri" charset="0"/>
-              <a:cs typeface="Times New Roman" charset="0"/>
-            </a:endParaRPr>
           </a:p>
         </p:txBody>
       </p:sp>
@@ -5773,6 +5758,66 @@
     <p:extLst>
       <p:ext uri="{BB962C8B-B14F-4D97-AF65-F5344CB8AC3E}">
         <p14:creationId xmlns:p14="http://schemas.microsoft.com/office/powerpoint/2010/main" val="1299763784"/>
+      </p:ext>
+    </p:extLst>
+  </p:cSld>
+  <p:clrMapOvr>
+    <a:masterClrMapping/>
+  </p:clrMapOvr>
+</p:sld>
+</file>
+
+<file path=ppt/slides/slide7.xml><?xml version="1.0" encoding="utf-8"?>
+<p:sld xmlns:a="http://schemas.openxmlformats.org/drawingml/2006/main" xmlns:r="http://schemas.openxmlformats.org/officeDocument/2006/relationships" xmlns:p="http://schemas.openxmlformats.org/presentationml/2006/main">
+  <p:cSld>
+    <p:spTree>
+      <p:nvGrpSpPr>
+        <p:cNvPr id="1" name=""/>
+        <p:cNvGrpSpPr/>
+        <p:nvPr/>
+      </p:nvGrpSpPr>
+      <p:grpSpPr>
+        <a:xfrm>
+          <a:off x="0" y="0"/>
+          <a:ext cx="0" cy="0"/>
+          <a:chOff x="0" y="0"/>
+          <a:chExt cx="0" cy="0"/>
+        </a:xfrm>
+      </p:grpSpPr>
+      <p:pic>
+        <p:nvPicPr>
+          <p:cNvPr id="2" name="Picture 1"/>
+          <p:cNvPicPr>
+            <a:picLocks noChangeAspect="1"/>
+          </p:cNvPicPr>
+          <p:nvPr/>
+        </p:nvPicPr>
+        <p:blipFill>
+          <a:blip r:embed="rId2">
+            <a:extLst>
+              <a:ext uri="{28A0092B-C50C-407E-A947-70E740481C1C}">
+                <a14:useLocalDpi xmlns:a14="http://schemas.microsoft.com/office/drawing/2010/main" val="0"/>
+              </a:ext>
+            </a:extLst>
+          </a:blip>
+          <a:stretch>
+            <a:fillRect/>
+          </a:stretch>
+        </p:blipFill>
+        <p:spPr>
+          <a:xfrm>
+            <a:off x="1435100" y="0"/>
+            <a:ext cx="9316756" cy="6858000"/>
+          </a:xfrm>
+          <a:prstGeom prst="rect">
+            <a:avLst/>
+          </a:prstGeom>
+        </p:spPr>
+      </p:pic>
+    </p:spTree>
+    <p:extLst>
+      <p:ext uri="{BB962C8B-B14F-4D97-AF65-F5344CB8AC3E}">
+        <p14:creationId xmlns:p14="http://schemas.microsoft.com/office/powerpoint/2010/main" val="155546342"/>
       </p:ext>
     </p:extLst>
   </p:cSld>

</xml_diff>

<commit_message>
update mock-up for stage0
</commit_message>
<xml_diff>
--- a/PRD/mock-ups for Yihan's project.pptx
+++ b/PRD/mock-ups for Yihan's project.pptx
@@ -206,7 +206,7 @@
           <a:p>
             <a:fld id="{ABF36AD8-19A8-7B40-9F96-270F4AD314FE}" type="datetimeFigureOut">
               <a:rPr lang="en-US" smtClean="0"/>
-              <a:t>5/11/18</a:t>
+              <a:t>5/19/18</a:t>
             </a:fld>
             <a:endParaRPr lang="en-US"/>
           </a:p>
@@ -1131,7 +1131,7 @@
           <a:p>
             <a:fld id="{4096D1C9-D0EA-5846-A11D-A9FE0A97A53F}" type="datetimeFigureOut">
               <a:rPr lang="en-US" smtClean="0"/>
-              <a:t>5/11/18</a:t>
+              <a:t>5/19/18</a:t>
             </a:fld>
             <a:endParaRPr lang="en-US"/>
           </a:p>
@@ -1301,7 +1301,7 @@
           <a:p>
             <a:fld id="{4096D1C9-D0EA-5846-A11D-A9FE0A97A53F}" type="datetimeFigureOut">
               <a:rPr lang="en-US" smtClean="0"/>
-              <a:t>5/11/18</a:t>
+              <a:t>5/19/18</a:t>
             </a:fld>
             <a:endParaRPr lang="en-US"/>
           </a:p>
@@ -1481,7 +1481,7 @@
           <a:p>
             <a:fld id="{4096D1C9-D0EA-5846-A11D-A9FE0A97A53F}" type="datetimeFigureOut">
               <a:rPr lang="en-US" smtClean="0"/>
-              <a:t>5/11/18</a:t>
+              <a:t>5/19/18</a:t>
             </a:fld>
             <a:endParaRPr lang="en-US"/>
           </a:p>
@@ -1651,7 +1651,7 @@
           <a:p>
             <a:fld id="{4096D1C9-D0EA-5846-A11D-A9FE0A97A53F}" type="datetimeFigureOut">
               <a:rPr lang="en-US" smtClean="0"/>
-              <a:t>5/11/18</a:t>
+              <a:t>5/19/18</a:t>
             </a:fld>
             <a:endParaRPr lang="en-US"/>
           </a:p>
@@ -1897,7 +1897,7 @@
           <a:p>
             <a:fld id="{4096D1C9-D0EA-5846-A11D-A9FE0A97A53F}" type="datetimeFigureOut">
               <a:rPr lang="en-US" smtClean="0"/>
-              <a:t>5/11/18</a:t>
+              <a:t>5/19/18</a:t>
             </a:fld>
             <a:endParaRPr lang="en-US"/>
           </a:p>
@@ -2129,7 +2129,7 @@
           <a:p>
             <a:fld id="{4096D1C9-D0EA-5846-A11D-A9FE0A97A53F}" type="datetimeFigureOut">
               <a:rPr lang="en-US" smtClean="0"/>
-              <a:t>5/11/18</a:t>
+              <a:t>5/19/18</a:t>
             </a:fld>
             <a:endParaRPr lang="en-US"/>
           </a:p>
@@ -2496,7 +2496,7 @@
           <a:p>
             <a:fld id="{4096D1C9-D0EA-5846-A11D-A9FE0A97A53F}" type="datetimeFigureOut">
               <a:rPr lang="en-US" smtClean="0"/>
-              <a:t>5/11/18</a:t>
+              <a:t>5/19/18</a:t>
             </a:fld>
             <a:endParaRPr lang="en-US"/>
           </a:p>
@@ -2614,7 +2614,7 @@
           <a:p>
             <a:fld id="{4096D1C9-D0EA-5846-A11D-A9FE0A97A53F}" type="datetimeFigureOut">
               <a:rPr lang="en-US" smtClean="0"/>
-              <a:t>5/11/18</a:t>
+              <a:t>5/19/18</a:t>
             </a:fld>
             <a:endParaRPr lang="en-US"/>
           </a:p>
@@ -2709,7 +2709,7 @@
           <a:p>
             <a:fld id="{4096D1C9-D0EA-5846-A11D-A9FE0A97A53F}" type="datetimeFigureOut">
               <a:rPr lang="en-US" smtClean="0"/>
-              <a:t>5/11/18</a:t>
+              <a:t>5/19/18</a:t>
             </a:fld>
             <a:endParaRPr lang="en-US"/>
           </a:p>
@@ -2986,7 +2986,7 @@
           <a:p>
             <a:fld id="{4096D1C9-D0EA-5846-A11D-A9FE0A97A53F}" type="datetimeFigureOut">
               <a:rPr lang="en-US" smtClean="0"/>
-              <a:t>5/11/18</a:t>
+              <a:t>5/19/18</a:t>
             </a:fld>
             <a:endParaRPr lang="en-US"/>
           </a:p>
@@ -3239,7 +3239,7 @@
           <a:p>
             <a:fld id="{4096D1C9-D0EA-5846-A11D-A9FE0A97A53F}" type="datetimeFigureOut">
               <a:rPr lang="en-US" smtClean="0"/>
-              <a:t>5/11/18</a:t>
+              <a:t>5/19/18</a:t>
             </a:fld>
             <a:endParaRPr lang="en-US"/>
           </a:p>
@@ -3452,7 +3452,7 @@
           <a:p>
             <a:fld id="{4096D1C9-D0EA-5846-A11D-A9FE0A97A53F}" type="datetimeFigureOut">
               <a:rPr lang="en-US" smtClean="0"/>
-              <a:t>5/11/18</a:t>
+              <a:t>5/19/18</a:t>
             </a:fld>
             <a:endParaRPr lang="en-US"/>
           </a:p>
@@ -3925,8 +3925,8 @@
         </p:nvSpPr>
         <p:spPr>
           <a:xfrm>
-            <a:off x="4250517" y="2268847"/>
-            <a:ext cx="3159006" cy="461665"/>
+            <a:off x="4292081" y="952666"/>
+            <a:ext cx="2746073" cy="461665"/>
           </a:xfrm>
           <a:prstGeom prst="rect">
             <a:avLst/>
@@ -3941,7 +3941,15 @@
           <a:p>
             <a:r>
               <a:rPr lang="en-US" sz="2400" dirty="0" smtClean="0"/>
-              <a:t>Please select conditions</a:t>
+              <a:t>Please select </a:t>
+            </a:r>
+            <a:r>
+              <a:rPr lang="en-US" altLang="zh-CN" sz="2400" dirty="0" smtClean="0"/>
+              <a:t>studie</a:t>
+            </a:r>
+            <a:r>
+              <a:rPr lang="en-US" sz="2400" dirty="0" smtClean="0"/>
+              <a:t>s</a:t>
             </a:r>
             <a:endParaRPr lang="en-US" sz="2400" dirty="0"/>
           </a:p>
@@ -3955,7 +3963,144 @@
         </p:nvSpPr>
         <p:spPr>
           <a:xfrm>
-            <a:off x="3609474" y="2887578"/>
+            <a:off x="3651038" y="1571397"/>
+            <a:ext cx="1636295" cy="613611"/>
+          </a:xfrm>
+          <a:prstGeom prst="roundRect">
+            <a:avLst/>
+          </a:prstGeom>
+          <a:solidFill>
+            <a:srgbClr val="92D050"/>
+          </a:solidFill>
+        </p:spPr>
+        <p:style>
+          <a:lnRef idx="2">
+            <a:schemeClr val="dk1"/>
+          </a:lnRef>
+          <a:fillRef idx="1">
+            <a:schemeClr val="lt1"/>
+          </a:fillRef>
+          <a:effectRef idx="0">
+            <a:schemeClr val="dk1"/>
+          </a:effectRef>
+          <a:fontRef idx="minor">
+            <a:schemeClr val="dk1"/>
+          </a:fontRef>
+        </p:style>
+        <p:txBody>
+          <a:bodyPr rtlCol="0" anchor="ctr"/>
+          <a:lstStyle/>
+          <a:p>
+            <a:pPr algn="ctr"/>
+            <a:r>
+              <a:rPr lang="en-US" altLang="zh-CN" sz="2400" b="1" dirty="0">
+                <a:solidFill>
+                  <a:schemeClr val="tx1"/>
+                </a:solidFill>
+              </a:rPr>
+              <a:t>1</a:t>
+            </a:r>
+            <a:endParaRPr lang="en-US" sz="2400" b="1" dirty="0">
+              <a:solidFill>
+                <a:schemeClr val="tx1"/>
+              </a:solidFill>
+            </a:endParaRPr>
+          </a:p>
+        </p:txBody>
+      </p:sp>
+      <p:sp>
+        <p:nvSpPr>
+          <p:cNvPr id="7" name="Rounded Rectangle 6"/>
+          <p:cNvSpPr/>
+          <p:nvPr/>
+        </p:nvSpPr>
+        <p:spPr>
+          <a:xfrm>
+            <a:off x="6293974" y="1571396"/>
+            <a:ext cx="1636295" cy="613611"/>
+          </a:xfrm>
+          <a:prstGeom prst="roundRect">
+            <a:avLst/>
+          </a:prstGeom>
+          <a:solidFill>
+            <a:srgbClr val="92D050"/>
+          </a:solidFill>
+          <a:ln/>
+        </p:spPr>
+        <p:style>
+          <a:lnRef idx="2">
+            <a:schemeClr val="dk1"/>
+          </a:lnRef>
+          <a:fillRef idx="1">
+            <a:schemeClr val="lt1"/>
+          </a:fillRef>
+          <a:effectRef idx="0">
+            <a:schemeClr val="dk1"/>
+          </a:effectRef>
+          <a:fontRef idx="minor">
+            <a:schemeClr val="dk1"/>
+          </a:fontRef>
+        </p:style>
+        <p:txBody>
+          <a:bodyPr rtlCol="0" anchor="ctr"/>
+          <a:lstStyle/>
+          <a:p>
+            <a:pPr algn="ctr"/>
+            <a:r>
+              <a:rPr lang="en-US" altLang="zh-CN" sz="2400" b="1" dirty="0">
+                <a:solidFill>
+                  <a:schemeClr val="tx1"/>
+                </a:solidFill>
+              </a:rPr>
+              <a:t>2</a:t>
+            </a:r>
+            <a:endParaRPr lang="en-US" sz="2400" b="1" dirty="0">
+              <a:solidFill>
+                <a:schemeClr val="tx1"/>
+              </a:solidFill>
+            </a:endParaRPr>
+          </a:p>
+        </p:txBody>
+      </p:sp>
+      <p:sp>
+        <p:nvSpPr>
+          <p:cNvPr id="8" name="TextBox 7"/>
+          <p:cNvSpPr txBox="1"/>
+          <p:nvPr/>
+        </p:nvSpPr>
+        <p:spPr>
+          <a:xfrm>
+            <a:off x="4292081" y="2947721"/>
+            <a:ext cx="3159006" cy="461665"/>
+          </a:xfrm>
+          <a:prstGeom prst="rect">
+            <a:avLst/>
+          </a:prstGeom>
+          <a:noFill/>
+        </p:spPr>
+        <p:txBody>
+          <a:bodyPr wrap="none" rtlCol="0">
+            <a:spAutoFit/>
+          </a:bodyPr>
+          <a:lstStyle/>
+          <a:p>
+            <a:r>
+              <a:rPr lang="en-US" sz="2400" dirty="0" smtClean="0"/>
+              <a:t>Please select conditions</a:t>
+            </a:r>
+            <a:endParaRPr lang="en-US" sz="2400" dirty="0"/>
+          </a:p>
+        </p:txBody>
+      </p:sp>
+      <p:sp>
+        <p:nvSpPr>
+          <p:cNvPr id="9" name="Rounded Rectangle 8"/>
+          <p:cNvSpPr/>
+          <p:nvPr/>
+        </p:nvSpPr>
+        <p:spPr>
+          <a:xfrm>
+            <a:off x="3651038" y="3566452"/>
             <a:ext cx="1636295" cy="613611"/>
           </a:xfrm>
           <a:prstGeom prst="roundRect">
@@ -4001,13 +4146,13 @@
       </p:sp>
       <p:sp>
         <p:nvSpPr>
-          <p:cNvPr id="7" name="Rounded Rectangle 6"/>
+          <p:cNvPr id="10" name="Rounded Rectangle 9"/>
           <p:cNvSpPr/>
           <p:nvPr/>
         </p:nvSpPr>
         <p:spPr>
           <a:xfrm>
-            <a:off x="6252410" y="2887577"/>
+            <a:off x="6293974" y="3566451"/>
             <a:ext cx="1636295" cy="613611"/>
           </a:xfrm>
           <a:prstGeom prst="roundRect">
@@ -4057,6 +4202,32 @@
               </a:rPr>
               <a:t>S</a:t>
             </a:r>
+          </a:p>
+        </p:txBody>
+      </p:sp>
+      <p:sp>
+        <p:nvSpPr>
+          <p:cNvPr id="2" name="TextBox 1"/>
+          <p:cNvSpPr txBox="1"/>
+          <p:nvPr/>
+        </p:nvSpPr>
+        <p:spPr>
+          <a:xfrm>
+            <a:off x="10368366" y="3580108"/>
+            <a:ext cx="184731" cy="369332"/>
+          </a:xfrm>
+          <a:prstGeom prst="rect">
+            <a:avLst/>
+          </a:prstGeom>
+          <a:noFill/>
+        </p:spPr>
+        <p:txBody>
+          <a:bodyPr wrap="none" rtlCol="0">
+            <a:spAutoFit/>
+          </a:bodyPr>
+          <a:lstStyle/>
+          <a:p>
+            <a:endParaRPr lang="en-US"/>
           </a:p>
         </p:txBody>
       </p:sp>

</xml_diff>

<commit_message>
Upload concrete deadlines for Cuimin and Yihan's projects
</commit_message>
<xml_diff>
--- a/PRD/mock-ups for Yihan's project.pptx
+++ b/PRD/mock-ups for Yihan's project.pptx
@@ -8,13 +8,13 @@
     <p:notesMasterId r:id="rId12"/>
   </p:notesMasterIdLst>
   <p:sldIdLst>
-    <p:sldId id="258" r:id="rId2"/>
-    <p:sldId id="257" r:id="rId3"/>
+    <p:sldId id="257" r:id="rId2"/>
+    <p:sldId id="258" r:id="rId3"/>
     <p:sldId id="259" r:id="rId4"/>
     <p:sldId id="262" r:id="rId5"/>
-    <p:sldId id="263" r:id="rId6"/>
-    <p:sldId id="264" r:id="rId7"/>
-    <p:sldId id="265" r:id="rId8"/>
+    <p:sldId id="265" r:id="rId6"/>
+    <p:sldId id="263" r:id="rId7"/>
+    <p:sldId id="264" r:id="rId8"/>
     <p:sldId id="266" r:id="rId9"/>
     <p:sldId id="267" r:id="rId10"/>
     <p:sldId id="268" r:id="rId11"/>
@@ -209,7 +209,7 @@
           <a:p>
             <a:fld id="{ABF36AD8-19A8-7B40-9F96-270F4AD314FE}" type="datetimeFigureOut">
               <a:rPr lang="en-US" smtClean="0"/>
-              <a:t>6/12/18</a:t>
+              <a:t>6/14/18</a:t>
             </a:fld>
             <a:endParaRPr lang="en-US"/>
           </a:p>
@@ -551,7 +551,7 @@
     </p:spTree>
     <p:extLst>
       <p:ext uri="{BB962C8B-B14F-4D97-AF65-F5344CB8AC3E}">
-        <p14:creationId xmlns:p14="http://schemas.microsoft.com/office/powerpoint/2010/main" val="1489964283"/>
+        <p14:creationId xmlns:p14="http://schemas.microsoft.com/office/powerpoint/2010/main" val="928244377"/>
       </p:ext>
     </p:extLst>
   </p:cSld>
@@ -635,7 +635,7 @@
     </p:spTree>
     <p:extLst>
       <p:ext uri="{BB962C8B-B14F-4D97-AF65-F5344CB8AC3E}">
-        <p14:creationId xmlns:p14="http://schemas.microsoft.com/office/powerpoint/2010/main" val="928244377"/>
+        <p14:creationId xmlns:p14="http://schemas.microsoft.com/office/powerpoint/2010/main" val="1489964283"/>
       </p:ext>
     </p:extLst>
   </p:cSld>
@@ -889,7 +889,7 @@
           <a:p>
             <a:fld id="{12295BB0-76B6-9D4C-BFF8-480CEE2DEBAE}" type="slidenum">
               <a:rPr lang="en-US" smtClean="0"/>
-              <a:t>5</a:t>
+              <a:t>6</a:t>
             </a:fld>
             <a:endParaRPr lang="en-US"/>
           </a:p>
@@ -984,7 +984,7 @@
           <a:p>
             <a:fld id="{12295BB0-76B6-9D4C-BFF8-480CEE2DEBAE}" type="slidenum">
               <a:rPr lang="en-US" smtClean="0"/>
-              <a:t>6</a:t>
+              <a:t>7</a:t>
             </a:fld>
             <a:endParaRPr lang="en-US"/>
           </a:p>
@@ -1302,7 +1302,7 @@
           <a:p>
             <a:fld id="{4096D1C9-D0EA-5846-A11D-A9FE0A97A53F}" type="datetimeFigureOut">
               <a:rPr lang="en-US" smtClean="0"/>
-              <a:t>6/12/18</a:t>
+              <a:t>6/14/18</a:t>
             </a:fld>
             <a:endParaRPr lang="en-US"/>
           </a:p>
@@ -1472,7 +1472,7 @@
           <a:p>
             <a:fld id="{4096D1C9-D0EA-5846-A11D-A9FE0A97A53F}" type="datetimeFigureOut">
               <a:rPr lang="en-US" smtClean="0"/>
-              <a:t>6/12/18</a:t>
+              <a:t>6/14/18</a:t>
             </a:fld>
             <a:endParaRPr lang="en-US"/>
           </a:p>
@@ -1652,7 +1652,7 @@
           <a:p>
             <a:fld id="{4096D1C9-D0EA-5846-A11D-A9FE0A97A53F}" type="datetimeFigureOut">
               <a:rPr lang="en-US" smtClean="0"/>
-              <a:t>6/12/18</a:t>
+              <a:t>6/14/18</a:t>
             </a:fld>
             <a:endParaRPr lang="en-US"/>
           </a:p>
@@ -1822,7 +1822,7 @@
           <a:p>
             <a:fld id="{4096D1C9-D0EA-5846-A11D-A9FE0A97A53F}" type="datetimeFigureOut">
               <a:rPr lang="en-US" smtClean="0"/>
-              <a:t>6/12/18</a:t>
+              <a:t>6/14/18</a:t>
             </a:fld>
             <a:endParaRPr lang="en-US"/>
           </a:p>
@@ -2068,7 +2068,7 @@
           <a:p>
             <a:fld id="{4096D1C9-D0EA-5846-A11D-A9FE0A97A53F}" type="datetimeFigureOut">
               <a:rPr lang="en-US" smtClean="0"/>
-              <a:t>6/12/18</a:t>
+              <a:t>6/14/18</a:t>
             </a:fld>
             <a:endParaRPr lang="en-US"/>
           </a:p>
@@ -2300,7 +2300,7 @@
           <a:p>
             <a:fld id="{4096D1C9-D0EA-5846-A11D-A9FE0A97A53F}" type="datetimeFigureOut">
               <a:rPr lang="en-US" smtClean="0"/>
-              <a:t>6/12/18</a:t>
+              <a:t>6/14/18</a:t>
             </a:fld>
             <a:endParaRPr lang="en-US"/>
           </a:p>
@@ -2667,7 +2667,7 @@
           <a:p>
             <a:fld id="{4096D1C9-D0EA-5846-A11D-A9FE0A97A53F}" type="datetimeFigureOut">
               <a:rPr lang="en-US" smtClean="0"/>
-              <a:t>6/12/18</a:t>
+              <a:t>6/14/18</a:t>
             </a:fld>
             <a:endParaRPr lang="en-US"/>
           </a:p>
@@ -2785,7 +2785,7 @@
           <a:p>
             <a:fld id="{4096D1C9-D0EA-5846-A11D-A9FE0A97A53F}" type="datetimeFigureOut">
               <a:rPr lang="en-US" smtClean="0"/>
-              <a:t>6/12/18</a:t>
+              <a:t>6/14/18</a:t>
             </a:fld>
             <a:endParaRPr lang="en-US"/>
           </a:p>
@@ -2880,7 +2880,7 @@
           <a:p>
             <a:fld id="{4096D1C9-D0EA-5846-A11D-A9FE0A97A53F}" type="datetimeFigureOut">
               <a:rPr lang="en-US" smtClean="0"/>
-              <a:t>6/12/18</a:t>
+              <a:t>6/14/18</a:t>
             </a:fld>
             <a:endParaRPr lang="en-US"/>
           </a:p>
@@ -3157,7 +3157,7 @@
           <a:p>
             <a:fld id="{4096D1C9-D0EA-5846-A11D-A9FE0A97A53F}" type="datetimeFigureOut">
               <a:rPr lang="en-US" smtClean="0"/>
-              <a:t>6/12/18</a:t>
+              <a:t>6/14/18</a:t>
             </a:fld>
             <a:endParaRPr lang="en-US"/>
           </a:p>
@@ -3410,7 +3410,7 @@
           <a:p>
             <a:fld id="{4096D1C9-D0EA-5846-A11D-A9FE0A97A53F}" type="datetimeFigureOut">
               <a:rPr lang="en-US" smtClean="0"/>
-              <a:t>6/12/18</a:t>
+              <a:t>6/14/18</a:t>
             </a:fld>
             <a:endParaRPr lang="en-US"/>
           </a:p>
@@ -3623,7 +3623,7 @@
           <a:p>
             <a:fld id="{4096D1C9-D0EA-5846-A11D-A9FE0A97A53F}" type="datetimeFigureOut">
               <a:rPr lang="en-US" smtClean="0"/>
-              <a:t>6/12/18</a:t>
+              <a:t>6/14/18</a:t>
             </a:fld>
             <a:endParaRPr lang="en-US"/>
           </a:p>
@@ -4030,14 +4030,14 @@
       </p:grpSpPr>
       <p:sp>
         <p:nvSpPr>
-          <p:cNvPr id="2" name="TextBox 1"/>
+          <p:cNvPr id="5" name="TextBox 4"/>
           <p:cNvSpPr txBox="1"/>
           <p:nvPr/>
         </p:nvSpPr>
         <p:spPr>
           <a:xfrm>
-            <a:off x="3946358" y="2731168"/>
-            <a:ext cx="5534336" cy="461665"/>
+            <a:off x="4292081" y="952666"/>
+            <a:ext cx="2746073" cy="461665"/>
           </a:xfrm>
           <a:prstGeom prst="rect">
             <a:avLst/>
@@ -4052,16 +4052,330 @@
           <a:p>
             <a:r>
               <a:rPr lang="en-US" sz="2400" dirty="0" smtClean="0"/>
-              <a:t>Please enter your metric number: _______</a:t>
+              <a:t>Please select </a:t>
+            </a:r>
+            <a:r>
+              <a:rPr lang="en-US" altLang="zh-CN" sz="2400" dirty="0" smtClean="0"/>
+              <a:t>studie</a:t>
+            </a:r>
+            <a:r>
+              <a:rPr lang="en-US" sz="2400" dirty="0" smtClean="0"/>
+              <a:t>s</a:t>
             </a:r>
             <a:endParaRPr lang="en-US" sz="2400" dirty="0"/>
+          </a:p>
+        </p:txBody>
+      </p:sp>
+      <p:sp>
+        <p:nvSpPr>
+          <p:cNvPr id="6" name="Rounded Rectangle 5"/>
+          <p:cNvSpPr/>
+          <p:nvPr/>
+        </p:nvSpPr>
+        <p:spPr>
+          <a:xfrm>
+            <a:off x="3651038" y="1571397"/>
+            <a:ext cx="1636295" cy="613611"/>
+          </a:xfrm>
+          <a:prstGeom prst="roundRect">
+            <a:avLst/>
+          </a:prstGeom>
+          <a:solidFill>
+            <a:srgbClr val="92D050"/>
+          </a:solidFill>
+        </p:spPr>
+        <p:style>
+          <a:lnRef idx="2">
+            <a:schemeClr val="dk1"/>
+          </a:lnRef>
+          <a:fillRef idx="1">
+            <a:schemeClr val="lt1"/>
+          </a:fillRef>
+          <a:effectRef idx="0">
+            <a:schemeClr val="dk1"/>
+          </a:effectRef>
+          <a:fontRef idx="minor">
+            <a:schemeClr val="dk1"/>
+          </a:fontRef>
+        </p:style>
+        <p:txBody>
+          <a:bodyPr rtlCol="0" anchor="ctr"/>
+          <a:lstStyle/>
+          <a:p>
+            <a:pPr algn="ctr"/>
+            <a:r>
+              <a:rPr lang="en-US" altLang="zh-CN" sz="2400" b="1" dirty="0">
+                <a:solidFill>
+                  <a:schemeClr val="tx1"/>
+                </a:solidFill>
+              </a:rPr>
+              <a:t>1</a:t>
+            </a:r>
+            <a:endParaRPr lang="en-US" sz="2400" b="1" dirty="0">
+              <a:solidFill>
+                <a:schemeClr val="tx1"/>
+              </a:solidFill>
+            </a:endParaRPr>
+          </a:p>
+        </p:txBody>
+      </p:sp>
+      <p:sp>
+        <p:nvSpPr>
+          <p:cNvPr id="7" name="Rounded Rectangle 6"/>
+          <p:cNvSpPr/>
+          <p:nvPr/>
+        </p:nvSpPr>
+        <p:spPr>
+          <a:xfrm>
+            <a:off x="6293974" y="1571396"/>
+            <a:ext cx="1636295" cy="613611"/>
+          </a:xfrm>
+          <a:prstGeom prst="roundRect">
+            <a:avLst/>
+          </a:prstGeom>
+          <a:solidFill>
+            <a:srgbClr val="92D050"/>
+          </a:solidFill>
+          <a:ln/>
+        </p:spPr>
+        <p:style>
+          <a:lnRef idx="2">
+            <a:schemeClr val="dk1"/>
+          </a:lnRef>
+          <a:fillRef idx="1">
+            <a:schemeClr val="lt1"/>
+          </a:fillRef>
+          <a:effectRef idx="0">
+            <a:schemeClr val="dk1"/>
+          </a:effectRef>
+          <a:fontRef idx="minor">
+            <a:schemeClr val="dk1"/>
+          </a:fontRef>
+        </p:style>
+        <p:txBody>
+          <a:bodyPr rtlCol="0" anchor="ctr"/>
+          <a:lstStyle/>
+          <a:p>
+            <a:pPr algn="ctr"/>
+            <a:r>
+              <a:rPr lang="en-US" altLang="zh-CN" sz="2400" b="1" dirty="0">
+                <a:solidFill>
+                  <a:schemeClr val="tx1"/>
+                </a:solidFill>
+              </a:rPr>
+              <a:t>2</a:t>
+            </a:r>
+            <a:endParaRPr lang="en-US" sz="2400" b="1" dirty="0">
+              <a:solidFill>
+                <a:schemeClr val="tx1"/>
+              </a:solidFill>
+            </a:endParaRPr>
+          </a:p>
+        </p:txBody>
+      </p:sp>
+      <p:sp>
+        <p:nvSpPr>
+          <p:cNvPr id="8" name="TextBox 7"/>
+          <p:cNvSpPr txBox="1"/>
+          <p:nvPr/>
+        </p:nvSpPr>
+        <p:spPr>
+          <a:xfrm>
+            <a:off x="4292081" y="2947721"/>
+            <a:ext cx="3159006" cy="461665"/>
+          </a:xfrm>
+          <a:prstGeom prst="rect">
+            <a:avLst/>
+          </a:prstGeom>
+          <a:noFill/>
+        </p:spPr>
+        <p:txBody>
+          <a:bodyPr wrap="none" rtlCol="0">
+            <a:spAutoFit/>
+          </a:bodyPr>
+          <a:lstStyle/>
+          <a:p>
+            <a:r>
+              <a:rPr lang="en-US" sz="2400" dirty="0" smtClean="0"/>
+              <a:t>Please select conditions</a:t>
+            </a:r>
+            <a:endParaRPr lang="en-US" sz="2400" dirty="0"/>
+          </a:p>
+        </p:txBody>
+      </p:sp>
+      <p:sp>
+        <p:nvSpPr>
+          <p:cNvPr id="9" name="Rounded Rectangle 8"/>
+          <p:cNvSpPr/>
+          <p:nvPr/>
+        </p:nvSpPr>
+        <p:spPr>
+          <a:xfrm>
+            <a:off x="3651038" y="3566452"/>
+            <a:ext cx="1636295" cy="613611"/>
+          </a:xfrm>
+          <a:prstGeom prst="roundRect">
+            <a:avLst/>
+          </a:prstGeom>
+        </p:spPr>
+        <p:style>
+          <a:lnRef idx="2">
+            <a:schemeClr val="accent1">
+              <a:shade val="50000"/>
+            </a:schemeClr>
+          </a:lnRef>
+          <a:fillRef idx="1">
+            <a:schemeClr val="accent1"/>
+          </a:fillRef>
+          <a:effectRef idx="0">
+            <a:schemeClr val="accent1"/>
+          </a:effectRef>
+          <a:fontRef idx="minor">
+            <a:schemeClr val="lt1"/>
+          </a:fontRef>
+        </p:style>
+        <p:txBody>
+          <a:bodyPr rtlCol="0" anchor="ctr"/>
+          <a:lstStyle/>
+          <a:p>
+            <a:pPr algn="ctr"/>
+            <a:r>
+              <a:rPr lang="en-US" sz="2400" b="1" dirty="0" smtClean="0">
+                <a:solidFill>
+                  <a:schemeClr val="tx1"/>
+                </a:solidFill>
+              </a:rPr>
+              <a:t>D</a:t>
+            </a:r>
+            <a:endParaRPr lang="en-US" sz="2400" b="1" dirty="0">
+              <a:solidFill>
+                <a:schemeClr val="tx1"/>
+              </a:solidFill>
+            </a:endParaRPr>
+          </a:p>
+        </p:txBody>
+      </p:sp>
+      <p:sp>
+        <p:nvSpPr>
+          <p:cNvPr id="10" name="Rounded Rectangle 9"/>
+          <p:cNvSpPr/>
+          <p:nvPr/>
+        </p:nvSpPr>
+        <p:spPr>
+          <a:xfrm>
+            <a:off x="6293974" y="3566451"/>
+            <a:ext cx="1636295" cy="613611"/>
+          </a:xfrm>
+          <a:prstGeom prst="roundRect">
+            <a:avLst/>
+          </a:prstGeom>
+          <a:solidFill>
+            <a:schemeClr val="accent2">
+              <a:lumMod val="60000"/>
+              <a:lumOff val="40000"/>
+            </a:schemeClr>
+          </a:solidFill>
+          <a:ln>
+            <a:solidFill>
+              <a:schemeClr val="accent2">
+                <a:lumMod val="60000"/>
+                <a:lumOff val="40000"/>
+              </a:schemeClr>
+            </a:solidFill>
+          </a:ln>
+        </p:spPr>
+        <p:style>
+          <a:lnRef idx="2">
+            <a:schemeClr val="accent1">
+              <a:shade val="50000"/>
+            </a:schemeClr>
+          </a:lnRef>
+          <a:fillRef idx="1">
+            <a:schemeClr val="accent1"/>
+          </a:fillRef>
+          <a:effectRef idx="0">
+            <a:schemeClr val="accent1"/>
+          </a:effectRef>
+          <a:fontRef idx="minor">
+            <a:schemeClr val="lt1"/>
+          </a:fontRef>
+        </p:style>
+        <p:txBody>
+          <a:bodyPr rtlCol="0" anchor="ctr"/>
+          <a:lstStyle/>
+          <a:p>
+            <a:pPr algn="ctr"/>
+            <a:r>
+              <a:rPr lang="en-US" sz="2400" b="1" dirty="0">
+                <a:solidFill>
+                  <a:schemeClr val="tx1"/>
+                </a:solidFill>
+              </a:rPr>
+              <a:t>S</a:t>
+            </a:r>
+          </a:p>
+        </p:txBody>
+      </p:sp>
+      <p:sp>
+        <p:nvSpPr>
+          <p:cNvPr id="2" name="TextBox 1"/>
+          <p:cNvSpPr txBox="1"/>
+          <p:nvPr/>
+        </p:nvSpPr>
+        <p:spPr>
+          <a:xfrm>
+            <a:off x="10368366" y="3580108"/>
+            <a:ext cx="184731" cy="369332"/>
+          </a:xfrm>
+          <a:prstGeom prst="rect">
+            <a:avLst/>
+          </a:prstGeom>
+          <a:noFill/>
+        </p:spPr>
+        <p:txBody>
+          <a:bodyPr wrap="none" rtlCol="0">
+            <a:spAutoFit/>
+          </a:bodyPr>
+          <a:lstStyle/>
+          <a:p>
+            <a:endParaRPr lang="en-US"/>
+          </a:p>
+        </p:txBody>
+      </p:sp>
+      <p:sp>
+        <p:nvSpPr>
+          <p:cNvPr id="3" name="TextBox 2"/>
+          <p:cNvSpPr txBox="1"/>
+          <p:nvPr/>
+        </p:nvSpPr>
+        <p:spPr>
+          <a:xfrm>
+            <a:off x="1033670" y="583096"/>
+            <a:ext cx="1325217" cy="369332"/>
+          </a:xfrm>
+          <a:prstGeom prst="rect">
+            <a:avLst/>
+          </a:prstGeom>
+          <a:noFill/>
+        </p:spPr>
+        <p:txBody>
+          <a:bodyPr wrap="square" rtlCol="0">
+            <a:spAutoFit/>
+          </a:bodyPr>
+          <a:lstStyle/>
+          <a:p>
+            <a:r>
+              <a:rPr lang="en-US" dirty="0" smtClean="0"/>
+              <a:t>Stage 1, I</a:t>
+            </a:r>
+            <a:endParaRPr lang="en-US" dirty="0"/>
           </a:p>
         </p:txBody>
       </p:sp>
     </p:spTree>
     <p:extLst>
       <p:ext uri="{BB962C8B-B14F-4D97-AF65-F5344CB8AC3E}">
-        <p14:creationId xmlns:p14="http://schemas.microsoft.com/office/powerpoint/2010/main" val="2142716918"/>
+        <p14:creationId xmlns:p14="http://schemas.microsoft.com/office/powerpoint/2010/main" val="1545617295"/>
       </p:ext>
     </p:extLst>
   </p:cSld>
@@ -5297,14 +5611,14 @@
       </p:grpSpPr>
       <p:sp>
         <p:nvSpPr>
-          <p:cNvPr id="5" name="TextBox 4"/>
+          <p:cNvPr id="2" name="TextBox 1"/>
           <p:cNvSpPr txBox="1"/>
           <p:nvPr/>
         </p:nvSpPr>
         <p:spPr>
           <a:xfrm>
-            <a:off x="4292081" y="952666"/>
-            <a:ext cx="2746073" cy="461665"/>
+            <a:off x="3946358" y="2731168"/>
+            <a:ext cx="5534336" cy="461665"/>
           </a:xfrm>
           <a:prstGeom prst="rect">
             <a:avLst/>
@@ -5319,15 +5633,7 @@
           <a:p>
             <a:r>
               <a:rPr lang="en-US" sz="2400" dirty="0" smtClean="0"/>
-              <a:t>Please select </a:t>
-            </a:r>
-            <a:r>
-              <a:rPr lang="en-US" altLang="zh-CN" sz="2400" dirty="0" smtClean="0"/>
-              <a:t>studie</a:t>
-            </a:r>
-            <a:r>
-              <a:rPr lang="en-US" sz="2400" dirty="0" smtClean="0"/>
-              <a:t>s</a:t>
+              <a:t>Please enter your metric number: _______</a:t>
             </a:r>
             <a:endParaRPr lang="en-US" sz="2400" dirty="0"/>
           </a:p>
@@ -5335,121 +5641,14 @@
       </p:sp>
       <p:sp>
         <p:nvSpPr>
-          <p:cNvPr id="6" name="Rounded Rectangle 5"/>
-          <p:cNvSpPr/>
+          <p:cNvPr id="3" name="TextBox 2"/>
+          <p:cNvSpPr txBox="1"/>
           <p:nvPr/>
         </p:nvSpPr>
         <p:spPr>
           <a:xfrm>
-            <a:off x="3651038" y="1571397"/>
-            <a:ext cx="1636295" cy="613611"/>
-          </a:xfrm>
-          <a:prstGeom prst="roundRect">
-            <a:avLst/>
-          </a:prstGeom>
-          <a:solidFill>
-            <a:srgbClr val="92D050"/>
-          </a:solidFill>
-        </p:spPr>
-        <p:style>
-          <a:lnRef idx="2">
-            <a:schemeClr val="dk1"/>
-          </a:lnRef>
-          <a:fillRef idx="1">
-            <a:schemeClr val="lt1"/>
-          </a:fillRef>
-          <a:effectRef idx="0">
-            <a:schemeClr val="dk1"/>
-          </a:effectRef>
-          <a:fontRef idx="minor">
-            <a:schemeClr val="dk1"/>
-          </a:fontRef>
-        </p:style>
-        <p:txBody>
-          <a:bodyPr rtlCol="0" anchor="ctr"/>
-          <a:lstStyle/>
-          <a:p>
-            <a:pPr algn="ctr"/>
-            <a:r>
-              <a:rPr lang="en-US" altLang="zh-CN" sz="2400" b="1" dirty="0">
-                <a:solidFill>
-                  <a:schemeClr val="tx1"/>
-                </a:solidFill>
-              </a:rPr>
-              <a:t>1</a:t>
-            </a:r>
-            <a:endParaRPr lang="en-US" sz="2400" b="1" dirty="0">
-              <a:solidFill>
-                <a:schemeClr val="tx1"/>
-              </a:solidFill>
-            </a:endParaRPr>
-          </a:p>
-        </p:txBody>
-      </p:sp>
-      <p:sp>
-        <p:nvSpPr>
-          <p:cNvPr id="7" name="Rounded Rectangle 6"/>
-          <p:cNvSpPr/>
-          <p:nvPr/>
-        </p:nvSpPr>
-        <p:spPr>
-          <a:xfrm>
-            <a:off x="6293974" y="1571396"/>
-            <a:ext cx="1636295" cy="613611"/>
-          </a:xfrm>
-          <a:prstGeom prst="roundRect">
-            <a:avLst/>
-          </a:prstGeom>
-          <a:solidFill>
-            <a:srgbClr val="92D050"/>
-          </a:solidFill>
-          <a:ln/>
-        </p:spPr>
-        <p:style>
-          <a:lnRef idx="2">
-            <a:schemeClr val="dk1"/>
-          </a:lnRef>
-          <a:fillRef idx="1">
-            <a:schemeClr val="lt1"/>
-          </a:fillRef>
-          <a:effectRef idx="0">
-            <a:schemeClr val="dk1"/>
-          </a:effectRef>
-          <a:fontRef idx="minor">
-            <a:schemeClr val="dk1"/>
-          </a:fontRef>
-        </p:style>
-        <p:txBody>
-          <a:bodyPr rtlCol="0" anchor="ctr"/>
-          <a:lstStyle/>
-          <a:p>
-            <a:pPr algn="ctr"/>
-            <a:r>
-              <a:rPr lang="en-US" altLang="zh-CN" sz="2400" b="1" dirty="0">
-                <a:solidFill>
-                  <a:schemeClr val="tx1"/>
-                </a:solidFill>
-              </a:rPr>
-              <a:t>2</a:t>
-            </a:r>
-            <a:endParaRPr lang="en-US" sz="2400" b="1" dirty="0">
-              <a:solidFill>
-                <a:schemeClr val="tx1"/>
-              </a:solidFill>
-            </a:endParaRPr>
-          </a:p>
-        </p:txBody>
-      </p:sp>
-      <p:sp>
-        <p:nvSpPr>
-          <p:cNvPr id="8" name="TextBox 7"/>
-          <p:cNvSpPr txBox="1"/>
-          <p:nvPr/>
-        </p:nvSpPr>
-        <p:spPr>
-          <a:xfrm>
-            <a:off x="4292081" y="2947721"/>
-            <a:ext cx="3159006" cy="461665"/>
+            <a:off x="1033670" y="583096"/>
+            <a:ext cx="1325217" cy="369332"/>
           </a:xfrm>
           <a:prstGeom prst="rect">
             <a:avLst/>
@@ -5457,162 +5656,23 @@
           <a:noFill/>
         </p:spPr>
         <p:txBody>
-          <a:bodyPr wrap="none" rtlCol="0">
+          <a:bodyPr wrap="square" rtlCol="0">
             <a:spAutoFit/>
           </a:bodyPr>
           <a:lstStyle/>
           <a:p>
             <a:r>
-              <a:rPr lang="en-US" sz="2400" dirty="0" smtClean="0"/>
-              <a:t>Please select conditions</a:t>
-            </a:r>
-            <a:endParaRPr lang="en-US" sz="2400" dirty="0"/>
-          </a:p>
-        </p:txBody>
-      </p:sp>
-      <p:sp>
-        <p:nvSpPr>
-          <p:cNvPr id="9" name="Rounded Rectangle 8"/>
-          <p:cNvSpPr/>
-          <p:nvPr/>
-        </p:nvSpPr>
-        <p:spPr>
-          <a:xfrm>
-            <a:off x="3651038" y="3566452"/>
-            <a:ext cx="1636295" cy="613611"/>
-          </a:xfrm>
-          <a:prstGeom prst="roundRect">
-            <a:avLst/>
-          </a:prstGeom>
-        </p:spPr>
-        <p:style>
-          <a:lnRef idx="2">
-            <a:schemeClr val="accent1">
-              <a:shade val="50000"/>
-            </a:schemeClr>
-          </a:lnRef>
-          <a:fillRef idx="1">
-            <a:schemeClr val="accent1"/>
-          </a:fillRef>
-          <a:effectRef idx="0">
-            <a:schemeClr val="accent1"/>
-          </a:effectRef>
-          <a:fontRef idx="minor">
-            <a:schemeClr val="lt1"/>
-          </a:fontRef>
-        </p:style>
-        <p:txBody>
-          <a:bodyPr rtlCol="0" anchor="ctr"/>
-          <a:lstStyle/>
-          <a:p>
-            <a:pPr algn="ctr"/>
-            <a:r>
-              <a:rPr lang="en-US" sz="2400" b="1" dirty="0" smtClean="0">
-                <a:solidFill>
-                  <a:schemeClr val="tx1"/>
-                </a:solidFill>
-              </a:rPr>
-              <a:t>D</a:t>
-            </a:r>
-            <a:endParaRPr lang="en-US" sz="2400" b="1" dirty="0">
-              <a:solidFill>
-                <a:schemeClr val="tx1"/>
-              </a:solidFill>
-            </a:endParaRPr>
-          </a:p>
-        </p:txBody>
-      </p:sp>
-      <p:sp>
-        <p:nvSpPr>
-          <p:cNvPr id="10" name="Rounded Rectangle 9"/>
-          <p:cNvSpPr/>
-          <p:nvPr/>
-        </p:nvSpPr>
-        <p:spPr>
-          <a:xfrm>
-            <a:off x="6293974" y="3566451"/>
-            <a:ext cx="1636295" cy="613611"/>
-          </a:xfrm>
-          <a:prstGeom prst="roundRect">
-            <a:avLst/>
-          </a:prstGeom>
-          <a:solidFill>
-            <a:schemeClr val="accent2">
-              <a:lumMod val="60000"/>
-              <a:lumOff val="40000"/>
-            </a:schemeClr>
-          </a:solidFill>
-          <a:ln>
-            <a:solidFill>
-              <a:schemeClr val="accent2">
-                <a:lumMod val="60000"/>
-                <a:lumOff val="40000"/>
-              </a:schemeClr>
-            </a:solidFill>
-          </a:ln>
-        </p:spPr>
-        <p:style>
-          <a:lnRef idx="2">
-            <a:schemeClr val="accent1">
-              <a:shade val="50000"/>
-            </a:schemeClr>
-          </a:lnRef>
-          <a:fillRef idx="1">
-            <a:schemeClr val="accent1"/>
-          </a:fillRef>
-          <a:effectRef idx="0">
-            <a:schemeClr val="accent1"/>
-          </a:effectRef>
-          <a:fontRef idx="minor">
-            <a:schemeClr val="lt1"/>
-          </a:fontRef>
-        </p:style>
-        <p:txBody>
-          <a:bodyPr rtlCol="0" anchor="ctr"/>
-          <a:lstStyle/>
-          <a:p>
-            <a:pPr algn="ctr"/>
-            <a:r>
-              <a:rPr lang="en-US" sz="2400" b="1" dirty="0">
-                <a:solidFill>
-                  <a:schemeClr val="tx1"/>
-                </a:solidFill>
-              </a:rPr>
-              <a:t>S</a:t>
-            </a:r>
-          </a:p>
-        </p:txBody>
-      </p:sp>
-      <p:sp>
-        <p:nvSpPr>
-          <p:cNvPr id="2" name="TextBox 1"/>
-          <p:cNvSpPr txBox="1"/>
-          <p:nvPr/>
-        </p:nvSpPr>
-        <p:spPr>
-          <a:xfrm>
-            <a:off x="10368366" y="3580108"/>
-            <a:ext cx="184731" cy="369332"/>
-          </a:xfrm>
-          <a:prstGeom prst="rect">
-            <a:avLst/>
-          </a:prstGeom>
-          <a:noFill/>
-        </p:spPr>
-        <p:txBody>
-          <a:bodyPr wrap="none" rtlCol="0">
-            <a:spAutoFit/>
-          </a:bodyPr>
-          <a:lstStyle/>
-          <a:p>
-            <a:endParaRPr lang="en-US"/>
+              <a:rPr lang="en-US" dirty="0" smtClean="0"/>
+              <a:t>Stage 1, II</a:t>
+            </a:r>
+            <a:endParaRPr lang="en-US" dirty="0"/>
           </a:p>
         </p:txBody>
       </p:sp>
     </p:spTree>
     <p:extLst>
       <p:ext uri="{BB962C8B-B14F-4D97-AF65-F5344CB8AC3E}">
-        <p14:creationId xmlns:p14="http://schemas.microsoft.com/office/powerpoint/2010/main" val="1545617295"/>
+        <p14:creationId xmlns:p14="http://schemas.microsoft.com/office/powerpoint/2010/main" val="2142716918"/>
       </p:ext>
     </p:extLst>
   </p:cSld>
@@ -6363,6 +6423,36 @@
               <a:ea typeface="Calibri" charset="0"/>
               <a:cs typeface="Times New Roman" charset="0"/>
             </a:endParaRPr>
+          </a:p>
+        </p:txBody>
+      </p:sp>
+      <p:sp>
+        <p:nvSpPr>
+          <p:cNvPr id="18" name="TextBox 17"/>
+          <p:cNvSpPr txBox="1"/>
+          <p:nvPr/>
+        </p:nvSpPr>
+        <p:spPr>
+          <a:xfrm>
+            <a:off x="1033670" y="583096"/>
+            <a:ext cx="1325217" cy="646331"/>
+          </a:xfrm>
+          <a:prstGeom prst="rect">
+            <a:avLst/>
+          </a:prstGeom>
+          <a:noFill/>
+        </p:spPr>
+        <p:txBody>
+          <a:bodyPr wrap="square" rtlCol="0">
+            <a:spAutoFit/>
+          </a:bodyPr>
+          <a:lstStyle/>
+          <a:p>
+            <a:r>
+              <a:rPr lang="en-US" dirty="0" smtClean="0"/>
+              <a:t>Stage 2, dominant</a:t>
+            </a:r>
+            <a:endParaRPr lang="en-US" dirty="0"/>
           </a:p>
         </p:txBody>
       </p:sp>
@@ -7137,6 +7227,36 @@
           </a:p>
         </p:txBody>
       </p:sp>
+      <p:sp>
+        <p:nvSpPr>
+          <p:cNvPr id="25" name="TextBox 24"/>
+          <p:cNvSpPr txBox="1"/>
+          <p:nvPr/>
+        </p:nvSpPr>
+        <p:spPr>
+          <a:xfrm>
+            <a:off x="1033670" y="583096"/>
+            <a:ext cx="1325217" cy="646331"/>
+          </a:xfrm>
+          <a:prstGeom prst="rect">
+            <a:avLst/>
+          </a:prstGeom>
+          <a:noFill/>
+        </p:spPr>
+        <p:txBody>
+          <a:bodyPr wrap="square" rtlCol="0">
+            <a:spAutoFit/>
+          </a:bodyPr>
+          <a:lstStyle/>
+          <a:p>
+            <a:r>
+              <a:rPr lang="en-US" dirty="0" smtClean="0"/>
+              <a:t>Stage 2, Submissive</a:t>
+            </a:r>
+            <a:endParaRPr lang="en-US" dirty="0"/>
+          </a:p>
+        </p:txBody>
+      </p:sp>
     </p:spTree>
     <p:extLst>
       <p:ext uri="{BB962C8B-B14F-4D97-AF65-F5344CB8AC3E}">
@@ -7151,172 +7271,6 @@
 </file>
 
 <file path=ppt/slides/slide5.xml><?xml version="1.0" encoding="utf-8"?>
-<p:sld xmlns:a="http://schemas.openxmlformats.org/drawingml/2006/main" xmlns:r="http://schemas.openxmlformats.org/officeDocument/2006/relationships" xmlns:p="http://schemas.openxmlformats.org/presentationml/2006/main">
-  <p:cSld>
-    <p:spTree>
-      <p:nvGrpSpPr>
-        <p:cNvPr id="1" name=""/>
-        <p:cNvGrpSpPr/>
-        <p:nvPr/>
-      </p:nvGrpSpPr>
-      <p:grpSpPr>
-        <a:xfrm>
-          <a:off x="0" y="0"/>
-          <a:ext cx="0" cy="0"/>
-          <a:chOff x="0" y="0"/>
-          <a:chExt cx="0" cy="0"/>
-        </a:xfrm>
-      </p:grpSpPr>
-      <p:sp>
-        <p:nvSpPr>
-          <p:cNvPr id="2" name="TextBox 1"/>
-          <p:cNvSpPr txBox="1"/>
-          <p:nvPr/>
-        </p:nvSpPr>
-        <p:spPr>
-          <a:xfrm>
-            <a:off x="2845979" y="2204225"/>
-            <a:ext cx="6407652" cy="2677656"/>
-          </a:xfrm>
-          <a:prstGeom prst="rect">
-            <a:avLst/>
-          </a:prstGeom>
-          <a:noFill/>
-        </p:spPr>
-        <p:txBody>
-          <a:bodyPr wrap="none" rtlCol="0">
-            <a:spAutoFit/>
-          </a:bodyPr>
-          <a:lstStyle/>
-          <a:p>
-            <a:r>
-              <a:rPr lang="en-US" sz="2400" dirty="0" smtClean="0"/>
-              <a:t>Now you will be redirected to an external portal</a:t>
-            </a:r>
-          </a:p>
-          <a:p>
-            <a:r>
-              <a:rPr lang="en-US" sz="2400" dirty="0" smtClean="0"/>
-              <a:t>to tell us your overall experience.</a:t>
-            </a:r>
-          </a:p>
-          <a:p>
-            <a:endParaRPr lang="en-US" sz="2400" dirty="0"/>
-          </a:p>
-          <a:p>
-            <a:r>
-              <a:rPr lang="en-US" sz="2400" dirty="0" smtClean="0"/>
-              <a:t>Please click the following link:  https//www</a:t>
-            </a:r>
-            <a:r>
-              <a:rPr lang="is-IS" sz="2400" dirty="0" smtClean="0"/>
-              <a:t>…....</a:t>
-            </a:r>
-          </a:p>
-          <a:p>
-            <a:endParaRPr lang="is-IS" sz="2400" dirty="0"/>
-          </a:p>
-          <a:p>
-            <a:r>
-              <a:rPr lang="is-IS" sz="2400" dirty="0" smtClean="0"/>
-              <a:t>After you finish the survey on the external portal, </a:t>
-            </a:r>
-          </a:p>
-          <a:p>
-            <a:r>
-              <a:rPr lang="is-IS" sz="2400" dirty="0" smtClean="0"/>
-              <a:t>please enter the verification code here _______</a:t>
-            </a:r>
-            <a:endParaRPr lang="en-US" sz="2400" dirty="0"/>
-          </a:p>
-        </p:txBody>
-      </p:sp>
-    </p:spTree>
-    <p:extLst>
-      <p:ext uri="{BB962C8B-B14F-4D97-AF65-F5344CB8AC3E}">
-        <p14:creationId xmlns:p14="http://schemas.microsoft.com/office/powerpoint/2010/main" val="352270001"/>
-      </p:ext>
-    </p:extLst>
-  </p:cSld>
-  <p:clrMapOvr>
-    <a:masterClrMapping/>
-  </p:clrMapOvr>
-</p:sld>
-</file>
-
-<file path=ppt/slides/slide6.xml><?xml version="1.0" encoding="utf-8"?>
-<p:sld xmlns:a="http://schemas.openxmlformats.org/drawingml/2006/main" xmlns:r="http://schemas.openxmlformats.org/officeDocument/2006/relationships" xmlns:p="http://schemas.openxmlformats.org/presentationml/2006/main">
-  <p:cSld>
-    <p:spTree>
-      <p:nvGrpSpPr>
-        <p:cNvPr id="1" name=""/>
-        <p:cNvGrpSpPr/>
-        <p:nvPr/>
-      </p:nvGrpSpPr>
-      <p:grpSpPr>
-        <a:xfrm>
-          <a:off x="0" y="0"/>
-          <a:ext cx="0" cy="0"/>
-          <a:chOff x="0" y="0"/>
-          <a:chExt cx="0" cy="0"/>
-        </a:xfrm>
-      </p:grpSpPr>
-      <p:sp>
-        <p:nvSpPr>
-          <p:cNvPr id="2" name="TextBox 1"/>
-          <p:cNvSpPr txBox="1"/>
-          <p:nvPr/>
-        </p:nvSpPr>
-        <p:spPr>
-          <a:xfrm>
-            <a:off x="3822372" y="2560686"/>
-            <a:ext cx="5023106" cy="1200329"/>
-          </a:xfrm>
-          <a:prstGeom prst="rect">
-            <a:avLst/>
-          </a:prstGeom>
-          <a:noFill/>
-        </p:spPr>
-        <p:txBody>
-          <a:bodyPr wrap="none" rtlCol="0">
-            <a:spAutoFit/>
-          </a:bodyPr>
-          <a:lstStyle/>
-          <a:p>
-            <a:r>
-              <a:rPr lang="en-US" sz="2400" dirty="0" smtClean="0"/>
-              <a:t>Thank you very much for participating!</a:t>
-            </a:r>
-          </a:p>
-          <a:p>
-            <a:r>
-              <a:rPr lang="en-US" sz="2400" dirty="0" smtClean="0"/>
-              <a:t>We hope you enjoyed it! </a:t>
-            </a:r>
-          </a:p>
-          <a:p>
-            <a:r>
-              <a:rPr lang="en-US" sz="2400" dirty="0" smtClean="0"/>
-              <a:t>Your bonus is _____</a:t>
-            </a:r>
-            <a:endParaRPr lang="en-US" sz="2400" dirty="0"/>
-          </a:p>
-        </p:txBody>
-      </p:sp>
-    </p:spTree>
-    <p:extLst>
-      <p:ext uri="{BB962C8B-B14F-4D97-AF65-F5344CB8AC3E}">
-        <p14:creationId xmlns:p14="http://schemas.microsoft.com/office/powerpoint/2010/main" val="1299763784"/>
-      </p:ext>
-    </p:extLst>
-  </p:cSld>
-  <p:clrMapOvr>
-    <a:masterClrMapping/>
-  </p:clrMapOvr>
-</p:sld>
-</file>
-
-<file path=ppt/slides/slide7.xml><?xml version="1.0" encoding="utf-8"?>
 <p:sld xmlns:a="http://schemas.openxmlformats.org/drawingml/2006/main" xmlns:r="http://schemas.openxmlformats.org/officeDocument/2006/relationships" xmlns:p="http://schemas.openxmlformats.org/presentationml/2006/main">
   <p:cSld>
     <p:spTree>
@@ -7363,10 +7317,266 @@
           </a:prstGeom>
         </p:spPr>
       </p:pic>
+      <p:sp>
+        <p:nvSpPr>
+          <p:cNvPr id="3" name="TextBox 2"/>
+          <p:cNvSpPr txBox="1"/>
+          <p:nvPr/>
+        </p:nvSpPr>
+        <p:spPr>
+          <a:xfrm>
+            <a:off x="490331" y="437323"/>
+            <a:ext cx="1325217" cy="369332"/>
+          </a:xfrm>
+          <a:prstGeom prst="rect">
+            <a:avLst/>
+          </a:prstGeom>
+          <a:noFill/>
+        </p:spPr>
+        <p:txBody>
+          <a:bodyPr wrap="square" rtlCol="0">
+            <a:spAutoFit/>
+          </a:bodyPr>
+          <a:lstStyle/>
+          <a:p>
+            <a:r>
+              <a:rPr lang="en-US" dirty="0" smtClean="0"/>
+              <a:t>Stage 3</a:t>
+            </a:r>
+            <a:endParaRPr lang="en-US" dirty="0"/>
+          </a:p>
+        </p:txBody>
+      </p:sp>
     </p:spTree>
     <p:extLst>
       <p:ext uri="{BB962C8B-B14F-4D97-AF65-F5344CB8AC3E}">
         <p14:creationId xmlns:p14="http://schemas.microsoft.com/office/powerpoint/2010/main" val="155546342"/>
+      </p:ext>
+    </p:extLst>
+  </p:cSld>
+  <p:clrMapOvr>
+    <a:masterClrMapping/>
+  </p:clrMapOvr>
+</p:sld>
+</file>
+
+<file path=ppt/slides/slide6.xml><?xml version="1.0" encoding="utf-8"?>
+<p:sld xmlns:a="http://schemas.openxmlformats.org/drawingml/2006/main" xmlns:r="http://schemas.openxmlformats.org/officeDocument/2006/relationships" xmlns:p="http://schemas.openxmlformats.org/presentationml/2006/main">
+  <p:cSld>
+    <p:spTree>
+      <p:nvGrpSpPr>
+        <p:cNvPr id="1" name=""/>
+        <p:cNvGrpSpPr/>
+        <p:nvPr/>
+      </p:nvGrpSpPr>
+      <p:grpSpPr>
+        <a:xfrm>
+          <a:off x="0" y="0"/>
+          <a:ext cx="0" cy="0"/>
+          <a:chOff x="0" y="0"/>
+          <a:chExt cx="0" cy="0"/>
+        </a:xfrm>
+      </p:grpSpPr>
+      <p:sp>
+        <p:nvSpPr>
+          <p:cNvPr id="2" name="TextBox 1"/>
+          <p:cNvSpPr txBox="1"/>
+          <p:nvPr/>
+        </p:nvSpPr>
+        <p:spPr>
+          <a:xfrm>
+            <a:off x="2845979" y="2204225"/>
+            <a:ext cx="6407652" cy="2677656"/>
+          </a:xfrm>
+          <a:prstGeom prst="rect">
+            <a:avLst/>
+          </a:prstGeom>
+          <a:noFill/>
+        </p:spPr>
+        <p:txBody>
+          <a:bodyPr wrap="none" rtlCol="0">
+            <a:spAutoFit/>
+          </a:bodyPr>
+          <a:lstStyle/>
+          <a:p>
+            <a:r>
+              <a:rPr lang="en-US" sz="2400" dirty="0" smtClean="0"/>
+              <a:t>Now you will be redirected to an external portal</a:t>
+            </a:r>
+          </a:p>
+          <a:p>
+            <a:r>
+              <a:rPr lang="en-US" sz="2400" dirty="0" smtClean="0"/>
+              <a:t>to tell us your overall experience.</a:t>
+            </a:r>
+          </a:p>
+          <a:p>
+            <a:endParaRPr lang="en-US" sz="2400" dirty="0"/>
+          </a:p>
+          <a:p>
+            <a:r>
+              <a:rPr lang="en-US" sz="2400" dirty="0" smtClean="0"/>
+              <a:t>Please click the following link:  https//www</a:t>
+            </a:r>
+            <a:r>
+              <a:rPr lang="is-IS" sz="2400" dirty="0" smtClean="0"/>
+              <a:t>…....</a:t>
+            </a:r>
+          </a:p>
+          <a:p>
+            <a:endParaRPr lang="is-IS" sz="2400" dirty="0"/>
+          </a:p>
+          <a:p>
+            <a:r>
+              <a:rPr lang="is-IS" sz="2400" dirty="0" smtClean="0"/>
+              <a:t>After you finish the survey on the external portal, </a:t>
+            </a:r>
+          </a:p>
+          <a:p>
+            <a:r>
+              <a:rPr lang="is-IS" sz="2400" dirty="0" smtClean="0"/>
+              <a:t>please enter the verification code here _______</a:t>
+            </a:r>
+            <a:endParaRPr lang="en-US" sz="2400" dirty="0"/>
+          </a:p>
+        </p:txBody>
+      </p:sp>
+      <p:sp>
+        <p:nvSpPr>
+          <p:cNvPr id="3" name="TextBox 2"/>
+          <p:cNvSpPr txBox="1"/>
+          <p:nvPr/>
+        </p:nvSpPr>
+        <p:spPr>
+          <a:xfrm>
+            <a:off x="1033670" y="583096"/>
+            <a:ext cx="1325217" cy="369332"/>
+          </a:xfrm>
+          <a:prstGeom prst="rect">
+            <a:avLst/>
+          </a:prstGeom>
+          <a:noFill/>
+        </p:spPr>
+        <p:txBody>
+          <a:bodyPr wrap="square" rtlCol="0">
+            <a:spAutoFit/>
+          </a:bodyPr>
+          <a:lstStyle/>
+          <a:p>
+            <a:r>
+              <a:rPr lang="en-US" dirty="0" smtClean="0"/>
+              <a:t>Stage 4, I</a:t>
+            </a:r>
+            <a:endParaRPr lang="en-US" dirty="0"/>
+          </a:p>
+        </p:txBody>
+      </p:sp>
+    </p:spTree>
+    <p:extLst>
+      <p:ext uri="{BB962C8B-B14F-4D97-AF65-F5344CB8AC3E}">
+        <p14:creationId xmlns:p14="http://schemas.microsoft.com/office/powerpoint/2010/main" val="352270001"/>
+      </p:ext>
+    </p:extLst>
+  </p:cSld>
+  <p:clrMapOvr>
+    <a:masterClrMapping/>
+  </p:clrMapOvr>
+</p:sld>
+</file>
+
+<file path=ppt/slides/slide7.xml><?xml version="1.0" encoding="utf-8"?>
+<p:sld xmlns:a="http://schemas.openxmlformats.org/drawingml/2006/main" xmlns:r="http://schemas.openxmlformats.org/officeDocument/2006/relationships" xmlns:p="http://schemas.openxmlformats.org/presentationml/2006/main">
+  <p:cSld>
+    <p:spTree>
+      <p:nvGrpSpPr>
+        <p:cNvPr id="1" name=""/>
+        <p:cNvGrpSpPr/>
+        <p:nvPr/>
+      </p:nvGrpSpPr>
+      <p:grpSpPr>
+        <a:xfrm>
+          <a:off x="0" y="0"/>
+          <a:ext cx="0" cy="0"/>
+          <a:chOff x="0" y="0"/>
+          <a:chExt cx="0" cy="0"/>
+        </a:xfrm>
+      </p:grpSpPr>
+      <p:sp>
+        <p:nvSpPr>
+          <p:cNvPr id="2" name="TextBox 1"/>
+          <p:cNvSpPr txBox="1"/>
+          <p:nvPr/>
+        </p:nvSpPr>
+        <p:spPr>
+          <a:xfrm>
+            <a:off x="3822372" y="2560686"/>
+            <a:ext cx="5023106" cy="1200329"/>
+          </a:xfrm>
+          <a:prstGeom prst="rect">
+            <a:avLst/>
+          </a:prstGeom>
+          <a:noFill/>
+        </p:spPr>
+        <p:txBody>
+          <a:bodyPr wrap="none" rtlCol="0">
+            <a:spAutoFit/>
+          </a:bodyPr>
+          <a:lstStyle/>
+          <a:p>
+            <a:r>
+              <a:rPr lang="en-US" sz="2400" dirty="0" smtClean="0"/>
+              <a:t>Thank you very much for participating!</a:t>
+            </a:r>
+          </a:p>
+          <a:p>
+            <a:r>
+              <a:rPr lang="en-US" sz="2400" dirty="0" smtClean="0"/>
+              <a:t>We hope you enjoyed it! </a:t>
+            </a:r>
+          </a:p>
+          <a:p>
+            <a:r>
+              <a:rPr lang="en-US" sz="2400" dirty="0" smtClean="0"/>
+              <a:t>Your bonus is _____</a:t>
+            </a:r>
+            <a:endParaRPr lang="en-US" sz="2400" dirty="0"/>
+          </a:p>
+        </p:txBody>
+      </p:sp>
+      <p:sp>
+        <p:nvSpPr>
+          <p:cNvPr id="3" name="TextBox 2"/>
+          <p:cNvSpPr txBox="1"/>
+          <p:nvPr/>
+        </p:nvSpPr>
+        <p:spPr>
+          <a:xfrm>
+            <a:off x="1033670" y="583096"/>
+            <a:ext cx="1325217" cy="369332"/>
+          </a:xfrm>
+          <a:prstGeom prst="rect">
+            <a:avLst/>
+          </a:prstGeom>
+          <a:noFill/>
+        </p:spPr>
+        <p:txBody>
+          <a:bodyPr wrap="square" rtlCol="0">
+            <a:spAutoFit/>
+          </a:bodyPr>
+          <a:lstStyle/>
+          <a:p>
+            <a:r>
+              <a:rPr lang="en-US" dirty="0" smtClean="0"/>
+              <a:t>Stage 4, II</a:t>
+            </a:r>
+            <a:endParaRPr lang="en-US" dirty="0"/>
+          </a:p>
+        </p:txBody>
+      </p:sp>
+    </p:spTree>
+    <p:extLst>
+      <p:ext uri="{BB962C8B-B14F-4D97-AF65-F5344CB8AC3E}">
+        <p14:creationId xmlns:p14="http://schemas.microsoft.com/office/powerpoint/2010/main" val="1299763784"/>
       </p:ext>
     </p:extLst>
   </p:cSld>

</xml_diff>